<commit_message>
Made very small changes to the Introduction in the Pflichtenheft and some changes to the Presentation(would be continued in a while).
</commit_message>
<xml_diff>
--- a/revdocs/Präsentation/Phase1.pptx
+++ b/revdocs/Präsentation/Phase1.pptx
@@ -136,6 +136,10 @@
 </p:presentation>
 </file>
 
+<file path=ppt/revisionInfo.xml><?xml version="1.0" encoding="utf-8"?>
+<p1510:revInfo xmlns:a="http://schemas.openxmlformats.org/drawingml/2006/main" xmlns:r="http://schemas.openxmlformats.org/officeDocument/2006/relationships" xmlns:p1510="http://schemas.microsoft.com/office/powerpoint/2015/10/main"/>
+</file>
+
 <file path=ppt/slideLayouts/slideLayout1.xml><?xml version="1.0" encoding="utf-8"?>
 <p:sldLayout xmlns:a="http://schemas.openxmlformats.org/drawingml/2006/main" xmlns:r="http://schemas.openxmlformats.org/officeDocument/2006/relationships" xmlns:p="http://schemas.openxmlformats.org/presentationml/2006/main" type="title" preserve="1">
   <p:cSld name="Titelfolie">
@@ -265,7 +269,7 @@
           <a:p>
             <a:fld id="{9B7F6F46-85A0-4A2D-B518-E5308448F940}" type="datetimeFigureOut">
               <a:rPr lang="de-DE" smtClean="0"/>
-              <a:t>25.04.2017</a:t>
+              <a:t>28.04.2017</a:t>
             </a:fld>
             <a:endParaRPr lang="de-DE"/>
           </a:p>
@@ -433,7 +437,7 @@
           <a:p>
             <a:fld id="{9B7F6F46-85A0-4A2D-B518-E5308448F940}" type="datetimeFigureOut">
               <a:rPr lang="de-DE" smtClean="0"/>
-              <a:t>25.04.2017</a:t>
+              <a:t>28.04.2017</a:t>
             </a:fld>
             <a:endParaRPr lang="de-DE"/>
           </a:p>
@@ -611,7 +615,7 @@
           <a:p>
             <a:fld id="{9B7F6F46-85A0-4A2D-B518-E5308448F940}" type="datetimeFigureOut">
               <a:rPr lang="de-DE" smtClean="0"/>
-              <a:t>25.04.2017</a:t>
+              <a:t>28.04.2017</a:t>
             </a:fld>
             <a:endParaRPr lang="de-DE"/>
           </a:p>
@@ -779,7 +783,7 @@
           <a:p>
             <a:fld id="{9B7F6F46-85A0-4A2D-B518-E5308448F940}" type="datetimeFigureOut">
               <a:rPr lang="de-DE" smtClean="0"/>
-              <a:t>25.04.2017</a:t>
+              <a:t>28.04.2017</a:t>
             </a:fld>
             <a:endParaRPr lang="de-DE"/>
           </a:p>
@@ -1024,7 +1028,7 @@
           <a:p>
             <a:fld id="{9B7F6F46-85A0-4A2D-B518-E5308448F940}" type="datetimeFigureOut">
               <a:rPr lang="de-DE" smtClean="0"/>
-              <a:t>25.04.2017</a:t>
+              <a:t>28.04.2017</a:t>
             </a:fld>
             <a:endParaRPr lang="de-DE"/>
           </a:p>
@@ -1253,7 +1257,7 @@
           <a:p>
             <a:fld id="{9B7F6F46-85A0-4A2D-B518-E5308448F940}" type="datetimeFigureOut">
               <a:rPr lang="de-DE" smtClean="0"/>
-              <a:t>25.04.2017</a:t>
+              <a:t>28.04.2017</a:t>
             </a:fld>
             <a:endParaRPr lang="de-DE"/>
           </a:p>
@@ -1617,7 +1621,7 @@
           <a:p>
             <a:fld id="{9B7F6F46-85A0-4A2D-B518-E5308448F940}" type="datetimeFigureOut">
               <a:rPr lang="de-DE" smtClean="0"/>
-              <a:t>25.04.2017</a:t>
+              <a:t>28.04.2017</a:t>
             </a:fld>
             <a:endParaRPr lang="de-DE"/>
           </a:p>
@@ -1734,7 +1738,7 @@
           <a:p>
             <a:fld id="{9B7F6F46-85A0-4A2D-B518-E5308448F940}" type="datetimeFigureOut">
               <a:rPr lang="de-DE" smtClean="0"/>
-              <a:t>25.04.2017</a:t>
+              <a:t>28.04.2017</a:t>
             </a:fld>
             <a:endParaRPr lang="de-DE"/>
           </a:p>
@@ -1829,7 +1833,7 @@
           <a:p>
             <a:fld id="{9B7F6F46-85A0-4A2D-B518-E5308448F940}" type="datetimeFigureOut">
               <a:rPr lang="de-DE" smtClean="0"/>
-              <a:t>25.04.2017</a:t>
+              <a:t>28.04.2017</a:t>
             </a:fld>
             <a:endParaRPr lang="de-DE"/>
           </a:p>
@@ -2104,7 +2108,7 @@
           <a:p>
             <a:fld id="{9B7F6F46-85A0-4A2D-B518-E5308448F940}" type="datetimeFigureOut">
               <a:rPr lang="de-DE" smtClean="0"/>
-              <a:t>25.04.2017</a:t>
+              <a:t>28.04.2017</a:t>
             </a:fld>
             <a:endParaRPr lang="de-DE"/>
           </a:p>
@@ -2356,7 +2360,7 @@
           <a:p>
             <a:fld id="{9B7F6F46-85A0-4A2D-B518-E5308448F940}" type="datetimeFigureOut">
               <a:rPr lang="de-DE" smtClean="0"/>
-              <a:t>25.04.2017</a:t>
+              <a:t>28.04.2017</a:t>
             </a:fld>
             <a:endParaRPr lang="de-DE"/>
           </a:p>
@@ -2567,7 +2571,7 @@
           <a:p>
             <a:fld id="{9B7F6F46-85A0-4A2D-B518-E5308448F940}" type="datetimeFigureOut">
               <a:rPr lang="de-DE" smtClean="0"/>
-              <a:t>25.04.2017</a:t>
+              <a:t>28.04.2017</a:t>
             </a:fld>
             <a:endParaRPr lang="de-DE"/>
           </a:p>
@@ -3034,7 +3038,7 @@
         </p:blipFill>
         <p:spPr>
           <a:xfrm>
-            <a:off x="7640320" y="4162208"/>
+            <a:off x="7609840" y="4162208"/>
             <a:ext cx="4582160" cy="2695792"/>
           </a:xfrm>
           <a:prstGeom prst="rect">
@@ -4168,7 +4172,7 @@
             </a:pPr>
             <a:r>
               <a:rPr lang="de-DE" dirty="0"/>
-              <a:t>Echtzeitvisualisierung von Hirnsignalen</a:t>
+              <a:t>Echtzeitvisualisierung von Hirnsignalen. </a:t>
             </a:r>
           </a:p>
           <a:p>

</xml_diff>